<commit_message>
update item07 slide and project
</commit_message>
<xml_diff>
--- a/more-effective-csharp-2nd-edition/slides/item07-使用Tuples限制型別的範圍.pptx
+++ b/more-effective-csharp-2nd-edition/slides/item07-使用Tuples限制型別的範圍.pptx
@@ -197,7 +197,7 @@
           <a:p>
             <a:fld id="{7287596F-5AEE-4A09-B007-52FE8F05C9A1}" type="datetimeFigureOut">
               <a:rPr lang="zh-TW" altLang="en-US" smtClean="0"/>
-              <a:t>2020/3/23</a:t>
+              <a:t>2020/3/25</a:t>
             </a:fld>
             <a:endParaRPr lang="zh-TW" altLang="en-US"/>
           </a:p>
@@ -475,7 +475,7 @@
           <a:p>
             <a:fld id="{BC026C39-E73D-4404-99C8-E3E59EB363C5}" type="datetimeFigureOut">
               <a:rPr lang="zh-TW" altLang="en-US" smtClean="0"/>
-              <a:t>2020/3/23</a:t>
+              <a:t>2020/3/25</a:t>
             </a:fld>
             <a:endParaRPr lang="zh-TW" altLang="en-US"/>
           </a:p>
@@ -659,7 +659,7 @@
           <a:p>
             <a:fld id="{BC026C39-E73D-4404-99C8-E3E59EB363C5}" type="datetimeFigureOut">
               <a:rPr lang="zh-TW" altLang="en-US" smtClean="0"/>
-              <a:t>2020/3/23</a:t>
+              <a:t>2020/3/25</a:t>
             </a:fld>
             <a:endParaRPr lang="zh-TW" altLang="en-US"/>
           </a:p>
@@ -853,7 +853,7 @@
           <a:p>
             <a:fld id="{BC026C39-E73D-4404-99C8-E3E59EB363C5}" type="datetimeFigureOut">
               <a:rPr lang="zh-TW" altLang="en-US" smtClean="0"/>
-              <a:t>2020/3/23</a:t>
+              <a:t>2020/3/25</a:t>
             </a:fld>
             <a:endParaRPr lang="zh-TW" altLang="en-US"/>
           </a:p>
@@ -1037,7 +1037,7 @@
           <a:p>
             <a:fld id="{BC026C39-E73D-4404-99C8-E3E59EB363C5}" type="datetimeFigureOut">
               <a:rPr lang="zh-TW" altLang="en-US" smtClean="0"/>
-              <a:t>2020/3/23</a:t>
+              <a:t>2020/3/25</a:t>
             </a:fld>
             <a:endParaRPr lang="zh-TW" altLang="en-US"/>
           </a:p>
@@ -1297,7 +1297,7 @@
           <a:p>
             <a:fld id="{BC026C39-E73D-4404-99C8-E3E59EB363C5}" type="datetimeFigureOut">
               <a:rPr lang="zh-TW" altLang="en-US" smtClean="0"/>
-              <a:t>2020/3/23</a:t>
+              <a:t>2020/3/25</a:t>
             </a:fld>
             <a:endParaRPr lang="zh-TW" altLang="en-US"/>
           </a:p>
@@ -1585,7 +1585,7 @@
           <a:p>
             <a:fld id="{BC026C39-E73D-4404-99C8-E3E59EB363C5}" type="datetimeFigureOut">
               <a:rPr lang="zh-TW" altLang="en-US" smtClean="0"/>
-              <a:t>2020/3/23</a:t>
+              <a:t>2020/3/25</a:t>
             </a:fld>
             <a:endParaRPr lang="zh-TW" altLang="en-US"/>
           </a:p>
@@ -2021,7 +2021,7 @@
           <a:p>
             <a:fld id="{BC026C39-E73D-4404-99C8-E3E59EB363C5}" type="datetimeFigureOut">
               <a:rPr lang="zh-TW" altLang="en-US" smtClean="0"/>
-              <a:t>2020/3/23</a:t>
+              <a:t>2020/3/25</a:t>
             </a:fld>
             <a:endParaRPr lang="zh-TW" altLang="en-US"/>
           </a:p>
@@ -2153,7 +2153,7 @@
           <a:p>
             <a:fld id="{BC026C39-E73D-4404-99C8-E3E59EB363C5}" type="datetimeFigureOut">
               <a:rPr lang="zh-TW" altLang="en-US" smtClean="0"/>
-              <a:t>2020/3/23</a:t>
+              <a:t>2020/3/25</a:t>
             </a:fld>
             <a:endParaRPr lang="zh-TW" altLang="en-US"/>
           </a:p>
@@ -2262,7 +2262,7 @@
           <a:p>
             <a:fld id="{BC026C39-E73D-4404-99C8-E3E59EB363C5}" type="datetimeFigureOut">
               <a:rPr lang="zh-TW" altLang="en-US" smtClean="0"/>
-              <a:t>2020/3/23</a:t>
+              <a:t>2020/3/25</a:t>
             </a:fld>
             <a:endParaRPr lang="zh-TW" altLang="en-US"/>
           </a:p>
@@ -2553,7 +2553,7 @@
           <a:p>
             <a:fld id="{BC026C39-E73D-4404-99C8-E3E59EB363C5}" type="datetimeFigureOut">
               <a:rPr lang="zh-TW" altLang="en-US" smtClean="0"/>
-              <a:t>2020/3/23</a:t>
+              <a:t>2020/3/25</a:t>
             </a:fld>
             <a:endParaRPr lang="zh-TW" altLang="en-US"/>
           </a:p>
@@ -2820,7 +2820,7 @@
           <a:p>
             <a:fld id="{BC026C39-E73D-4404-99C8-E3E59EB363C5}" type="datetimeFigureOut">
               <a:rPr lang="zh-TW" altLang="en-US" smtClean="0"/>
-              <a:t>2020/3/23</a:t>
+              <a:t>2020/3/25</a:t>
             </a:fld>
             <a:endParaRPr lang="zh-TW" altLang="en-US"/>
           </a:p>
@@ -3040,7 +3040,7 @@
           <a:p>
             <a:fld id="{BC026C39-E73D-4404-99C8-E3E59EB363C5}" type="datetimeFigureOut">
               <a:rPr lang="zh-TW" altLang="en-US" smtClean="0"/>
-              <a:t>2020/3/23</a:t>
+              <a:t>2020/3/25</a:t>
             </a:fld>
             <a:endParaRPr lang="zh-TW" altLang="en-US"/>
           </a:p>
@@ -3582,11 +3582,7 @@
           <a:p>
             <a:r>
               <a:rPr lang="zh-TW" altLang="en-US" sz="2800" dirty="0" smtClean="0"/>
-              <a:t>無法作為方法的引數或回傳</a:t>
-            </a:r>
-            <a:r>
-              <a:rPr lang="zh-TW" altLang="en-US" sz="2800" dirty="0" smtClean="0"/>
-              <a:t>值</a:t>
+              <a:t>無法作為方法的引數或回傳值</a:t>
             </a:r>
             <a:endParaRPr lang="en-US" altLang="zh-TW" sz="2800" dirty="0" smtClean="0"/>
           </a:p>
@@ -4137,7 +4133,15 @@
             </a:r>
             <a:r>
               <a:rPr lang="en-US" altLang="zh-TW" dirty="0" smtClean="0"/>
-              <a:t> aPoint3 </a:t>
+              <a:t> </a:t>
+            </a:r>
+            <a:r>
+              <a:rPr lang="en-US" altLang="zh-TW" dirty="0" err="1" smtClean="0"/>
+              <a:t>aPoint</a:t>
+            </a:r>
+            <a:r>
+              <a:rPr lang="en-US" altLang="zh-TW" dirty="0" smtClean="0"/>
+              <a:t> </a:t>
             </a:r>
             <a:r>
               <a:rPr lang="en-US" altLang="zh-TW" dirty="0"/>
@@ -4192,7 +4196,19 @@
             </a:r>
             <a:r>
               <a:rPr lang="en-US" altLang="zh-TW" dirty="0"/>
-              <a:t> Run) aPoint3 = (</a:t>
+              <a:t> Run) </a:t>
+            </a:r>
+            <a:r>
+              <a:rPr lang="en-US" altLang="zh-TW" dirty="0" err="1" smtClean="0"/>
+              <a:t>aPoint</a:t>
+            </a:r>
+            <a:r>
+              <a:rPr lang="en-US" altLang="zh-TW" dirty="0" smtClean="0"/>
+              <a:t> </a:t>
+            </a:r>
+            <a:r>
+              <a:rPr lang="en-US" altLang="zh-TW" dirty="0"/>
+              <a:t>= (</a:t>
             </a:r>
             <a:r>
               <a:rPr lang="en-US" altLang="zh-TW" dirty="0" smtClean="0"/>

</xml_diff>